<commit_message>
FEAT : 修改 README
</commit_message>
<xml_diff>
--- a/lineBot-workingFlow.pptx
+++ b/lineBot-workingFlow.pptx
@@ -444,7 +444,7 @@
           <a:p>
             <a:fld id="{D98B40CF-768E-4D03-A7D3-4735E18FA762}" type="datetimeFigureOut">
               <a:rPr lang="zh-TW" altLang="en-US" smtClean="0"/>
-              <a:t>2021/9/10</a:t>
+              <a:t>2021/9/11</a:t>
             </a:fld>
             <a:endParaRPr lang="zh-TW" altLang="en-US"/>
           </a:p>
@@ -700,7 +700,7 @@
           <a:p>
             <a:fld id="{D98B40CF-768E-4D03-A7D3-4735E18FA762}" type="datetimeFigureOut">
               <a:rPr lang="zh-TW" altLang="en-US" smtClean="0"/>
-              <a:t>2021/9/10</a:t>
+              <a:t>2021/9/11</a:t>
             </a:fld>
             <a:endParaRPr lang="zh-TW" altLang="en-US"/>
           </a:p>
@@ -874,7 +874,7 @@
           <a:p>
             <a:fld id="{D98B40CF-768E-4D03-A7D3-4735E18FA762}" type="datetimeFigureOut">
               <a:rPr lang="zh-TW" altLang="en-US" smtClean="0"/>
-              <a:t>2021/9/10</a:t>
+              <a:t>2021/9/11</a:t>
             </a:fld>
             <a:endParaRPr lang="zh-TW" altLang="en-US"/>
           </a:p>
@@ -1217,7 +1217,7 @@
           <a:p>
             <a:fld id="{D98B40CF-768E-4D03-A7D3-4735E18FA762}" type="datetimeFigureOut">
               <a:rPr lang="zh-TW" altLang="en-US" smtClean="0"/>
-              <a:t>2021/9/10</a:t>
+              <a:t>2021/9/11</a:t>
             </a:fld>
             <a:endParaRPr lang="zh-TW" altLang="en-US"/>
           </a:p>
@@ -1492,7 +1492,7 @@
           <a:p>
             <a:fld id="{D98B40CF-768E-4D03-A7D3-4735E18FA762}" type="datetimeFigureOut">
               <a:rPr lang="zh-TW" altLang="en-US" smtClean="0"/>
-              <a:t>2021/9/10</a:t>
+              <a:t>2021/9/11</a:t>
             </a:fld>
             <a:endParaRPr lang="zh-TW" altLang="en-US"/>
           </a:p>
@@ -1871,7 +1871,7 @@
           <a:p>
             <a:fld id="{D98B40CF-768E-4D03-A7D3-4735E18FA762}" type="datetimeFigureOut">
               <a:rPr lang="zh-TW" altLang="en-US" smtClean="0"/>
-              <a:t>2021/9/10</a:t>
+              <a:t>2021/9/11</a:t>
             </a:fld>
             <a:endParaRPr lang="zh-TW" altLang="en-US"/>
           </a:p>
@@ -1989,7 +1989,7 @@
           <a:p>
             <a:fld id="{D98B40CF-768E-4D03-A7D3-4735E18FA762}" type="datetimeFigureOut">
               <a:rPr lang="zh-TW" altLang="en-US" smtClean="0"/>
-              <a:t>2021/9/10</a:t>
+              <a:t>2021/9/11</a:t>
             </a:fld>
             <a:endParaRPr lang="zh-TW" altLang="en-US"/>
           </a:p>
@@ -2160,7 +2160,7 @@
           <a:p>
             <a:fld id="{D98B40CF-768E-4D03-A7D3-4735E18FA762}" type="datetimeFigureOut">
               <a:rPr lang="zh-TW" altLang="en-US" smtClean="0"/>
-              <a:t>2021/9/10</a:t>
+              <a:t>2021/9/11</a:t>
             </a:fld>
             <a:endParaRPr lang="zh-TW" altLang="en-US"/>
           </a:p>
@@ -2514,7 +2514,7 @@
           <a:p>
             <a:fld id="{D98B40CF-768E-4D03-A7D3-4735E18FA762}" type="datetimeFigureOut">
               <a:rPr lang="zh-TW" altLang="en-US" smtClean="0"/>
-              <a:t>2021/9/10</a:t>
+              <a:t>2021/9/11</a:t>
             </a:fld>
             <a:endParaRPr lang="zh-TW" altLang="en-US"/>
           </a:p>
@@ -2896,7 +2896,7 @@
           <a:p>
             <a:fld id="{D98B40CF-768E-4D03-A7D3-4735E18FA762}" type="datetimeFigureOut">
               <a:rPr lang="zh-TW" altLang="en-US" smtClean="0"/>
-              <a:t>2021/9/10</a:t>
+              <a:t>2021/9/11</a:t>
             </a:fld>
             <a:endParaRPr lang="zh-TW" altLang="en-US"/>
           </a:p>
@@ -3183,7 +3183,7 @@
           <a:p>
             <a:fld id="{D98B40CF-768E-4D03-A7D3-4735E18FA762}" type="datetimeFigureOut">
               <a:rPr lang="zh-TW" altLang="en-US" smtClean="0"/>
-              <a:t>2021/9/10</a:t>
+              <a:t>2021/9/11</a:t>
             </a:fld>
             <a:endParaRPr lang="zh-TW" altLang="en-US"/>
           </a:p>
@@ -4668,7 +4668,7 @@
         </p:nvSpPr>
         <p:spPr>
           <a:xfrm>
-            <a:off x="9217178" y="2537000"/>
+            <a:off x="9702202" y="2537000"/>
             <a:ext cx="973495" cy="953575"/>
           </a:xfrm>
           <a:prstGeom prst="roundRect">
@@ -5168,8 +5168,8 @@
         </p:nvSpPr>
         <p:spPr>
           <a:xfrm>
-            <a:off x="6537366" y="2141438"/>
-            <a:ext cx="2492990" cy="646331"/>
+            <a:off x="6001903" y="2141973"/>
+            <a:ext cx="4108817" cy="646331"/>
           </a:xfrm>
           <a:prstGeom prst="rect">
             <a:avLst/>
@@ -5182,6 +5182,7 @@
           </a:bodyPr>
           <a:lstStyle/>
           <a:p>
+            <a:pPr algn="ctr"/>
             <a:r>
               <a:rPr lang="zh-TW" altLang="en-US" dirty="0">
                 <a:latin typeface="標楷體" panose="03000509000000000000" pitchFamily="65" charset="-120"/>
@@ -5195,12 +5196,13 @@
             </a:endParaRPr>
           </a:p>
           <a:p>
+            <a:pPr algn="ctr"/>
             <a:r>
               <a:rPr lang="zh-TW" altLang="en-US" dirty="0">
                 <a:latin typeface="標楷體" panose="03000509000000000000" pitchFamily="65" charset="-120"/>
                 <a:ea typeface="標楷體" panose="03000509000000000000" pitchFamily="65" charset="-120"/>
               </a:rPr>
-              <a:t>發出通知警示救護人員</a:t>
+              <a:t>發出通知警示救護人員並傳輸機台編號</a:t>
             </a:r>
             <a:endParaRPr lang="en-US" altLang="zh-TW" dirty="0">
               <a:latin typeface="標楷體" panose="03000509000000000000" pitchFamily="65" charset="-120"/>
@@ -5995,6 +5997,112 @@
           <a:p>
             <a:pPr algn="ctr"/>
             <a:endParaRPr lang="zh-TW" altLang="en-US"/>
+          </a:p>
+        </p:txBody>
+      </p:sp>
+      <p:sp>
+        <p:nvSpPr>
+          <p:cNvPr id="3" name="箭號: 弧形下彎 2">
+            <a:extLst>
+              <a:ext uri="{FF2B5EF4-FFF2-40B4-BE49-F238E27FC236}">
+                <a16:creationId xmlns:a16="http://schemas.microsoft.com/office/drawing/2014/main" id="{8FFAF192-FE85-4ACC-BFEC-6FFD383E50F0}"/>
+              </a:ext>
+            </a:extLst>
+          </p:cNvPr>
+          <p:cNvSpPr/>
+          <p:nvPr/>
+        </p:nvSpPr>
+        <p:spPr>
+          <a:xfrm>
+            <a:off x="2351314" y="1825752"/>
+            <a:ext cx="7288026" cy="695831"/>
+          </a:xfrm>
+          <a:prstGeom prst="curvedDownArrow">
+            <a:avLst/>
+          </a:prstGeom>
+        </p:spPr>
+        <p:style>
+          <a:lnRef idx="2">
+            <a:schemeClr val="accent2">
+              <a:shade val="50000"/>
+            </a:schemeClr>
+          </a:lnRef>
+          <a:fillRef idx="1">
+            <a:schemeClr val="accent2"/>
+          </a:fillRef>
+          <a:effectRef idx="0">
+            <a:schemeClr val="accent2"/>
+          </a:effectRef>
+          <a:fontRef idx="minor">
+            <a:schemeClr val="lt1"/>
+          </a:fontRef>
+        </p:style>
+        <p:txBody>
+          <a:bodyPr rtlCol="0" anchor="ctr"/>
+          <a:lstStyle/>
+          <a:p>
+            <a:pPr algn="ctr"/>
+            <a:endParaRPr lang="zh-TW" altLang="en-US">
+              <a:solidFill>
+                <a:schemeClr val="tx1"/>
+              </a:solidFill>
+            </a:endParaRPr>
+          </a:p>
+        </p:txBody>
+      </p:sp>
+      <p:sp>
+        <p:nvSpPr>
+          <p:cNvPr id="40" name="文字方塊 39">
+            <a:extLst>
+              <a:ext uri="{FF2B5EF4-FFF2-40B4-BE49-F238E27FC236}">
+                <a16:creationId xmlns:a16="http://schemas.microsoft.com/office/drawing/2014/main" id="{70395F4F-AA76-4B6C-AE02-4E6645F403EA}"/>
+              </a:ext>
+            </a:extLst>
+          </p:cNvPr>
+          <p:cNvSpPr txBox="1"/>
+          <p:nvPr/>
+        </p:nvSpPr>
+        <p:spPr>
+          <a:xfrm>
+            <a:off x="8791573" y="1734979"/>
+            <a:ext cx="2954655" cy="369332"/>
+          </a:xfrm>
+          <a:prstGeom prst="rect">
+            <a:avLst/>
+          </a:prstGeom>
+          <a:noFill/>
+        </p:spPr>
+        <p:txBody>
+          <a:bodyPr wrap="none" rtlCol="0">
+            <a:spAutoFit/>
+          </a:bodyPr>
+          <a:lstStyle/>
+          <a:p>
+            <a:r>
+              <a:rPr lang="zh-TW" altLang="en-US" dirty="0">
+                <a:latin typeface="標楷體" panose="03000509000000000000" pitchFamily="65" charset="-120"/>
+                <a:ea typeface="標楷體" panose="03000509000000000000" pitchFamily="65" charset="-120"/>
+              </a:rPr>
+              <a:t>透過</a:t>
+            </a:r>
+            <a:r>
+              <a:rPr lang="en-US" altLang="zh-TW" dirty="0">
+                <a:latin typeface="標楷體" panose="03000509000000000000" pitchFamily="65" charset="-120"/>
+                <a:ea typeface="標楷體" panose="03000509000000000000" pitchFamily="65" charset="-120"/>
+              </a:rPr>
+              <a:t>Line</a:t>
+            </a:r>
+            <a:r>
+              <a:rPr lang="zh-TW" altLang="en-US" dirty="0">
+                <a:latin typeface="標楷體" panose="03000509000000000000" pitchFamily="65" charset="-120"/>
+                <a:ea typeface="標楷體" panose="03000509000000000000" pitchFamily="65" charset="-120"/>
+              </a:rPr>
+              <a:t>按鈕進行電話溝通</a:t>
+            </a:r>
+            <a:endParaRPr lang="en-US" altLang="zh-TW" dirty="0">
+              <a:latin typeface="標楷體" panose="03000509000000000000" pitchFamily="65" charset="-120"/>
+              <a:ea typeface="標楷體" panose="03000509000000000000" pitchFamily="65" charset="-120"/>
+            </a:endParaRPr>
           </a:p>
         </p:txBody>
       </p:sp>

</xml_diff>